<commit_message>
ADDED microplanning and algorithm sheet
</commit_message>
<xml_diff>
--- a/Presentations/Additional Sessions/Additional Session 1.pptx
+++ b/Presentations/Additional Sessions/Additional Session 1.pptx
@@ -295,18 +295,18 @@
   <pc:docChgLst>
     <pc:chgData name="Sreejith Rajan" userId="ec11bca0e4bee75f" providerId="LiveId" clId="{7B4F392D-EAB3-4CE7-903E-F84869825F47}"/>
     <pc:docChg chg="undo custSel addSld delSld modSld sldOrd">
-      <pc:chgData name="Sreejith Rajan" userId="ec11bca0e4bee75f" providerId="LiveId" clId="{7B4F392D-EAB3-4CE7-903E-F84869825F47}" dt="2025-10-22T13:55:08.256" v="5403" actId="47"/>
+      <pc:chgData name="Sreejith Rajan" userId="ec11bca0e4bee75f" providerId="LiveId" clId="{7B4F392D-EAB3-4CE7-903E-F84869825F47}" dt="2025-10-22T14:21:17.098" v="5493" actId="20577"/>
       <pc:docMkLst>
         <pc:docMk/>
       </pc:docMkLst>
       <pc:sldChg chg="modSp mod">
-        <pc:chgData name="Sreejith Rajan" userId="ec11bca0e4bee75f" providerId="LiveId" clId="{7B4F392D-EAB3-4CE7-903E-F84869825F47}" dt="2025-10-17T10:56:28.163" v="4845" actId="20577"/>
+        <pc:chgData name="Sreejith Rajan" userId="ec11bca0e4bee75f" providerId="LiveId" clId="{7B4F392D-EAB3-4CE7-903E-F84869825F47}" dt="2025-10-22T14:12:21.003" v="5429" actId="20577"/>
         <pc:sldMkLst>
           <pc:docMk/>
           <pc:sldMk cId="0" sldId="256"/>
         </pc:sldMkLst>
         <pc:spChg chg="mod">
-          <ac:chgData name="Sreejith Rajan" userId="ec11bca0e4bee75f" providerId="LiveId" clId="{7B4F392D-EAB3-4CE7-903E-F84869825F47}" dt="2025-10-17T10:56:28.163" v="4845" actId="20577"/>
+          <ac:chgData name="Sreejith Rajan" userId="ec11bca0e4bee75f" providerId="LiveId" clId="{7B4F392D-EAB3-4CE7-903E-F84869825F47}" dt="2025-10-22T14:12:21.003" v="5429" actId="20577"/>
           <ac:spMkLst>
             <pc:docMk/>
             <pc:sldMk cId="0" sldId="256"/>
@@ -565,33 +565,9 @@
           <pc:docMk/>
           <pc:sldMk cId="2237710589" sldId="309"/>
         </pc:sldMkLst>
-        <pc:spChg chg="mod">
-          <ac:chgData name="Sreejith Rajan" userId="ec11bca0e4bee75f" providerId="LiveId" clId="{7B4F392D-EAB3-4CE7-903E-F84869825F47}" dt="2025-10-17T11:55:10.086" v="5071" actId="1076"/>
-          <ac:spMkLst>
-            <pc:docMk/>
-            <pc:sldMk cId="2237710589" sldId="309"/>
-            <ac:spMk id="54" creationId="{97A3ECAF-E25E-6F1B-D904-C1BDEC6254CD}"/>
-          </ac:spMkLst>
-        </pc:spChg>
-        <pc:graphicFrameChg chg="add mod modGraphic">
-          <ac:chgData name="Sreejith Rajan" userId="ec11bca0e4bee75f" providerId="LiveId" clId="{7B4F392D-EAB3-4CE7-903E-F84869825F47}" dt="2025-10-17T12:01:44.967" v="5115" actId="14100"/>
-          <ac:graphicFrameMkLst>
-            <pc:docMk/>
-            <pc:sldMk cId="2237710589" sldId="309"/>
-            <ac:graphicFrameMk id="2" creationId="{551E3600-1FAF-CBBE-4CE6-2A896DF5E48A}"/>
-          </ac:graphicFrameMkLst>
-        </pc:graphicFrameChg>
-        <pc:picChg chg="add mod modCrop">
-          <ac:chgData name="Sreejith Rajan" userId="ec11bca0e4bee75f" providerId="LiveId" clId="{7B4F392D-EAB3-4CE7-903E-F84869825F47}" dt="2025-10-17T11:57:20.454" v="5086" actId="1076"/>
-          <ac:picMkLst>
-            <pc:docMk/>
-            <pc:sldMk cId="2237710589" sldId="309"/>
-            <ac:picMk id="5" creationId="{5174DE35-6DAA-4FBC-4A33-00BE6DDAA5C5}"/>
-          </ac:picMkLst>
-        </pc:picChg>
       </pc:sldChg>
       <pc:sldChg chg="addSp delSp modSp add mod ord">
-        <pc:chgData name="Sreejith Rajan" userId="ec11bca0e4bee75f" providerId="LiveId" clId="{7B4F392D-EAB3-4CE7-903E-F84869825F47}" dt="2025-10-22T13:35:37.289" v="5350" actId="14734"/>
+        <pc:chgData name="Sreejith Rajan" userId="ec11bca0e4bee75f" providerId="LiveId" clId="{7B4F392D-EAB3-4CE7-903E-F84869825F47}" dt="2025-10-22T14:14:54.711" v="5490" actId="1076"/>
         <pc:sldMkLst>
           <pc:docMk/>
           <pc:sldMk cId="1438249901" sldId="310"/>
@@ -605,7 +581,7 @@
           </ac:spMkLst>
         </pc:spChg>
         <pc:spChg chg="mod">
-          <ac:chgData name="Sreejith Rajan" userId="ec11bca0e4bee75f" providerId="LiveId" clId="{7B4F392D-EAB3-4CE7-903E-F84869825F47}" dt="2025-10-22T13:35:00.761" v="5348" actId="20577"/>
+          <ac:chgData name="Sreejith Rajan" userId="ec11bca0e4bee75f" providerId="LiveId" clId="{7B4F392D-EAB3-4CE7-903E-F84869825F47}" dt="2025-10-22T14:14:54.711" v="5490" actId="1076"/>
           <ac:spMkLst>
             <pc:docMk/>
             <pc:sldMk cId="1438249901" sldId="310"/>
@@ -621,7 +597,7 @@
           </ac:graphicFrameMkLst>
         </pc:graphicFrameChg>
         <pc:graphicFrameChg chg="add mod modGraphic">
-          <ac:chgData name="Sreejith Rajan" userId="ec11bca0e4bee75f" providerId="LiveId" clId="{7B4F392D-EAB3-4CE7-903E-F84869825F47}" dt="2025-10-22T13:35:37.289" v="5350" actId="14734"/>
+          <ac:chgData name="Sreejith Rajan" userId="ec11bca0e4bee75f" providerId="LiveId" clId="{7B4F392D-EAB3-4CE7-903E-F84869825F47}" dt="2025-10-22T14:14:50.375" v="5489" actId="122"/>
           <ac:graphicFrameMkLst>
             <pc:docMk/>
             <pc:sldMk cId="1438249901" sldId="310"/>
@@ -644,7 +620,7 @@
         </pc:sldMkLst>
       </pc:sldChg>
       <pc:sldChg chg="addSp delSp modSp add mod">
-        <pc:chgData name="Sreejith Rajan" userId="ec11bca0e4bee75f" providerId="LiveId" clId="{7B4F392D-EAB3-4CE7-903E-F84869825F47}" dt="2025-10-22T13:39:22.017" v="5395" actId="20577"/>
+        <pc:chgData name="Sreejith Rajan" userId="ec11bca0e4bee75f" providerId="LiveId" clId="{7B4F392D-EAB3-4CE7-903E-F84869825F47}" dt="2025-10-22T14:21:17.098" v="5493" actId="20577"/>
         <pc:sldMkLst>
           <pc:docMk/>
           <pc:sldMk cId="3603331044" sldId="311"/>
@@ -674,7 +650,7 @@
           </ac:spMkLst>
         </pc:spChg>
         <pc:graphicFrameChg chg="add mod modGraphic">
-          <ac:chgData name="Sreejith Rajan" userId="ec11bca0e4bee75f" providerId="LiveId" clId="{7B4F392D-EAB3-4CE7-903E-F84869825F47}" dt="2025-10-22T13:39:22.017" v="5395" actId="20577"/>
+          <ac:chgData name="Sreejith Rajan" userId="ec11bca0e4bee75f" providerId="LiveId" clId="{7B4F392D-EAB3-4CE7-903E-F84869825F47}" dt="2025-10-22T14:21:17.098" v="5493" actId="20577"/>
           <ac:graphicFrameMkLst>
             <pc:docMk/>
             <pc:sldMk cId="3603331044" sldId="311"/>
@@ -695,30 +671,6 @@
           <pc:docMk/>
           <pc:sldMk cId="2855112447" sldId="313"/>
         </pc:sldMkLst>
-        <pc:spChg chg="mod">
-          <ac:chgData name="Sreejith Rajan" userId="ec11bca0e4bee75f" providerId="LiveId" clId="{7B4F392D-EAB3-4CE7-903E-F84869825F47}" dt="2025-10-17T11:59:44.277" v="5103" actId="1076"/>
-          <ac:spMkLst>
-            <pc:docMk/>
-            <pc:sldMk cId="2855112447" sldId="313"/>
-            <ac:spMk id="3" creationId="{8FEA6191-CF3F-E334-EAE0-F39E153FF31A}"/>
-          </ac:spMkLst>
-        </pc:spChg>
-        <pc:graphicFrameChg chg="add mod modGraphic">
-          <ac:chgData name="Sreejith Rajan" userId="ec11bca0e4bee75f" providerId="LiveId" clId="{7B4F392D-EAB3-4CE7-903E-F84869825F47}" dt="2025-10-17T11:59:40.699" v="5102" actId="1076"/>
-          <ac:graphicFrameMkLst>
-            <pc:docMk/>
-            <pc:sldMk cId="2855112447" sldId="313"/>
-            <ac:graphicFrameMk id="4" creationId="{9C4FB3FD-2104-5D17-2624-FAC359784385}"/>
-          </ac:graphicFrameMkLst>
-        </pc:graphicFrameChg>
-        <pc:picChg chg="add mod modCrop">
-          <ac:chgData name="Sreejith Rajan" userId="ec11bca0e4bee75f" providerId="LiveId" clId="{7B4F392D-EAB3-4CE7-903E-F84869825F47}" dt="2025-10-17T12:00:51.317" v="5107" actId="1076"/>
-          <ac:picMkLst>
-            <pc:docMk/>
-            <pc:sldMk cId="2855112447" sldId="313"/>
-            <ac:picMk id="6" creationId="{17A0D31E-E12B-586E-7477-AB4BA92C112D}"/>
-          </ac:picMkLst>
-        </pc:picChg>
       </pc:sldChg>
       <pc:sldChg chg="addSp delSp modSp add del mod">
         <pc:chgData name="Sreejith Rajan" userId="ec11bca0e4bee75f" providerId="LiveId" clId="{7B4F392D-EAB3-4CE7-903E-F84869825F47}" dt="2025-10-22T13:55:08.256" v="5403" actId="47"/>
@@ -726,22 +678,6 @@
           <pc:docMk/>
           <pc:sldMk cId="482960161" sldId="314"/>
         </pc:sldMkLst>
-        <pc:spChg chg="add mod">
-          <ac:chgData name="Sreejith Rajan" userId="ec11bca0e4bee75f" providerId="LiveId" clId="{7B4F392D-EAB3-4CE7-903E-F84869825F47}" dt="2025-10-17T14:03:11.813" v="5293" actId="1076"/>
-          <ac:spMkLst>
-            <pc:docMk/>
-            <pc:sldMk cId="482960161" sldId="314"/>
-            <ac:spMk id="2" creationId="{9825318B-F3A1-989D-E47B-AD540653FA16}"/>
-          </ac:spMkLst>
-        </pc:spChg>
-        <pc:spChg chg="mod">
-          <ac:chgData name="Sreejith Rajan" userId="ec11bca0e4bee75f" providerId="LiveId" clId="{7B4F392D-EAB3-4CE7-903E-F84869825F47}" dt="2025-10-17T14:03:00.673" v="5287" actId="1076"/>
-          <ac:spMkLst>
-            <pc:docMk/>
-            <pc:sldMk cId="482960161" sldId="314"/>
-            <ac:spMk id="3" creationId="{A4C0EC8C-FFFA-39B0-4E3A-CE5945EE46C6}"/>
-          </ac:spMkLst>
-        </pc:spChg>
       </pc:sldChg>
       <pc:sldChg chg="addSp delSp modSp add del mod">
         <pc:chgData name="Sreejith Rajan" userId="ec11bca0e4bee75f" providerId="LiveId" clId="{7B4F392D-EAB3-4CE7-903E-F84869825F47}" dt="2025-10-17T12:06:56.243" v="5160" actId="47"/>
@@ -1316,6 +1252,67 @@
 </file>
 
 <file path=ppt/notesSlides/notesSlide2.xml><?xml version="1.0" encoding="utf-8"?>
+<p:notes xmlns:a="http://schemas.openxmlformats.org/drawingml/2006/main" xmlns:r="http://schemas.openxmlformats.org/officeDocument/2006/relationships" xmlns:p="http://schemas.openxmlformats.org/presentationml/2006/main">
+  <p:cSld>
+    <p:spTree>
+      <p:nvGrpSpPr>
+        <p:cNvPr id="1" name=""/>
+        <p:cNvGrpSpPr/>
+        <p:nvPr/>
+      </p:nvGrpSpPr>
+      <p:grpSpPr>
+        <a:xfrm>
+          <a:off x="0" y="0"/>
+          <a:ext cx="0" cy="0"/>
+          <a:chOff x="0" y="0"/>
+          <a:chExt cx="0" cy="0"/>
+        </a:xfrm>
+      </p:grpSpPr>
+      <p:sp>
+        <p:nvSpPr>
+          <p:cNvPr id="2" name="Slide Image Placeholder 1"/>
+          <p:cNvSpPr>
+            <a:spLocks noGrp="1" noRot="1" noChangeAspect="1"/>
+          </p:cNvSpPr>
+          <p:nvPr>
+            <p:ph type="sldImg"/>
+          </p:nvPr>
+        </p:nvSpPr>
+        <p:spPr/>
+      </p:sp>
+      <p:sp>
+        <p:nvSpPr>
+          <p:cNvPr id="3" name="Notes Placeholder 2"/>
+          <p:cNvSpPr>
+            <a:spLocks noGrp="1"/>
+          </p:cNvSpPr>
+          <p:nvPr>
+            <p:ph type="body" idx="1"/>
+          </p:nvPr>
+        </p:nvSpPr>
+        <p:spPr/>
+        <p:txBody>
+          <a:bodyPr/>
+          <a:lstStyle/>
+          <a:p>
+            <a:endParaRPr lang="en-IN" dirty="0"/>
+          </a:p>
+        </p:txBody>
+      </p:sp>
+    </p:spTree>
+    <p:extLst>
+      <p:ext uri="{BB962C8B-B14F-4D97-AF65-F5344CB8AC3E}">
+        <p14:creationId xmlns:p14="http://schemas.microsoft.com/office/powerpoint/2010/main" val="2384741875"/>
+      </p:ext>
+    </p:extLst>
+  </p:cSld>
+  <p:clrMapOvr>
+    <a:masterClrMapping/>
+  </p:clrMapOvr>
+</p:notes>
+</file>
+
+<file path=ppt/notesSlides/notesSlide3.xml><?xml version="1.0" encoding="utf-8"?>
 <p:notes xmlns:a="http://schemas.openxmlformats.org/drawingml/2006/main" xmlns:r="http://schemas.openxmlformats.org/officeDocument/2006/relationships" xmlns:p="http://schemas.openxmlformats.org/presentationml/2006/main" showMasterSp="0" showMasterPhAnim="0">
   <p:cSld>
     <p:spTree>
@@ -4068,14 +4065,14 @@
         </p:spPr>
         <p:txBody>
           <a:bodyPr spcFirstLastPara="1" wrap="square" lIns="91425" tIns="91425" rIns="91425" bIns="91425" anchor="b" anchorCtr="0">
-            <a:normAutofit fontScale="90000"/>
+            <a:normAutofit/>
           </a:bodyPr>
           <a:lstStyle/>
           <a:p>
             <a:pPr lvl="0"/>
             <a:r>
               <a:rPr lang="en-US" dirty="0"/>
-              <a:t>Universal Synchronous and Asynchronous Receiver and Transmitter - USART</a:t>
+              <a:t>Coding Skills Improvement</a:t>
             </a:r>
             <a:endParaRPr dirty="0"/>
           </a:p>
@@ -4172,7 +4169,7 @@
         </p:nvSpPr>
         <p:spPr>
           <a:xfrm>
-            <a:off x="2692473" y="115962"/>
+            <a:off x="2370502" y="122402"/>
             <a:ext cx="5905500" cy="572700"/>
           </a:xfrm>
         </p:spPr>
@@ -4205,35 +4202,35 @@
           <p:nvPr>
             <p:extLst>
               <p:ext uri="{D42A27DB-BD31-4B8C-83A1-F6EECF244321}">
-                <p14:modId xmlns:p14="http://schemas.microsoft.com/office/powerpoint/2010/main" val="844394622"/>
+                <p14:modId xmlns:p14="http://schemas.microsoft.com/office/powerpoint/2010/main" val="3802895802"/>
               </p:ext>
             </p:extLst>
           </p:nvPr>
         </p:nvGraphicFramePr>
         <p:xfrm>
-          <a:off x="2692473" y="789437"/>
-          <a:ext cx="6336403" cy="3880928"/>
+          <a:off x="2472745" y="789437"/>
+          <a:ext cx="6556132" cy="4040141"/>
         </p:xfrm>
         <a:graphic>
           <a:graphicData uri="http://schemas.openxmlformats.org/drawingml/2006/table">
             <a:tbl>
               <a:tblPr/>
               <a:tblGrid>
-                <a:gridCol w="1493161">
+                <a:gridCol w="1544940">
                   <a:extLst>
                     <a:ext uri="{9D8B030D-6E8A-4147-A177-3AD203B41FA5}">
                       <a16:colId xmlns:a16="http://schemas.microsoft.com/office/drawing/2014/main" val="1423561126"/>
                     </a:ext>
                   </a:extLst>
                 </a:gridCol>
-                <a:gridCol w="2427667">
+                <a:gridCol w="2511852">
                   <a:extLst>
                     <a:ext uri="{9D8B030D-6E8A-4147-A177-3AD203B41FA5}">
                       <a16:colId xmlns:a16="http://schemas.microsoft.com/office/drawing/2014/main" val="575611628"/>
                     </a:ext>
                   </a:extLst>
                 </a:gridCol>
-                <a:gridCol w="2415575">
+                <a:gridCol w="2499340">
                   <a:extLst>
                     <a:ext uri="{9D8B030D-6E8A-4147-A177-3AD203B41FA5}">
                       <a16:colId xmlns:a16="http://schemas.microsoft.com/office/drawing/2014/main" val="3835762750"/>
@@ -4241,13 +4238,13 @@
                   </a:extLst>
                 </a:gridCol>
               </a:tblGrid>
-              <a:tr h="275199">
+              <a:tr h="289799">
                 <a:tc>
                   <a:txBody>
                     <a:bodyPr/>
                     <a:lstStyle/>
                     <a:p>
-                      <a:pPr>
+                      <a:pPr algn="ctr">
                         <a:buNone/>
                       </a:pPr>
                       <a:r>
@@ -4310,7 +4307,7 @@
                     <a:bodyPr/>
                     <a:lstStyle/>
                     <a:p>
-                      <a:pPr>
+                      <a:pPr algn="ctr">
                         <a:buNone/>
                       </a:pPr>
                       <a:r>
@@ -4373,7 +4370,7 @@
                     <a:bodyPr/>
                     <a:lstStyle/>
                     <a:p>
-                      <a:pPr>
+                      <a:pPr algn="ctr">
                         <a:buNone/>
                       </a:pPr>
                       <a:r>
@@ -4437,7 +4434,7 @@
                   </a:ext>
                 </a:extLst>
               </a:tr>
-              <a:tr h="501834">
+              <a:tr h="528458">
                 <a:tc>
                   <a:txBody>
                     <a:bodyPr/>
@@ -4557,11 +4554,11 @@
                       </a:pPr>
                       <a:r>
                         <a:rPr lang="en-US" sz="1100" dirty="0"/>
-                        <a:t>They </a:t>
+                        <a:t> </a:t>
                       </a:r>
                       <a:r>
                         <a:rPr lang="en-US" sz="1100" i="1" dirty="0"/>
-                        <a:t>recognize</a:t>
+                        <a:t>Recognize</a:t>
                       </a:r>
                       <a:r>
                         <a:rPr lang="en-US" sz="1100" dirty="0"/>
@@ -4623,7 +4620,7 @@
                   </a:ext>
                 </a:extLst>
               </a:tr>
-              <a:tr h="388516">
+              <a:tr h="409128">
                 <a:tc>
                   <a:txBody>
                     <a:bodyPr/>
@@ -4742,8 +4739,8 @@
                         <a:buNone/>
                       </a:pPr>
                       <a:r>
-                        <a:rPr lang="en-US" sz="1100"/>
-                        <a:t>They see mistakes as failure, not feedback.</a:t>
+                        <a:rPr lang="en-US" sz="1100" dirty="0"/>
+                        <a:t>Some see mistakes as failure, not feedback.</a:t>
                       </a:r>
                     </a:p>
                   </a:txBody>
@@ -4793,7 +4790,7 @@
                   </a:ext>
                 </a:extLst>
               </a:tr>
-              <a:tr h="388516">
+              <a:tr h="409128">
                 <a:tc>
                   <a:txBody>
                     <a:bodyPr/>
@@ -4912,8 +4909,8 @@
                         <a:buNone/>
                       </a:pPr>
                       <a:r>
-                        <a:rPr lang="en-US" sz="1100"/>
-                        <a:t>They rely on examples instead of exploring the datasheet.</a:t>
+                        <a:rPr lang="en-US" sz="1100" dirty="0"/>
+                        <a:t>Some rely on examples instead of exploring the datasheet.</a:t>
                       </a:r>
                     </a:p>
                   </a:txBody>
@@ -4963,7 +4960,7 @@
                   </a:ext>
                 </a:extLst>
               </a:tr>
-              <a:tr h="388516">
+              <a:tr h="409128">
                 <a:tc>
                   <a:txBody>
                     <a:bodyPr/>
@@ -5082,8 +5079,8 @@
                         <a:buNone/>
                       </a:pPr>
                       <a:r>
-                        <a:rPr lang="en-US" sz="1100"/>
-                        <a:t>It skips the thinking process — logic never gets internalized.</a:t>
+                        <a:rPr lang="en-US" sz="1100" dirty="0"/>
+                        <a:t>It skips the thinking process - logic never gets internalized.</a:t>
                       </a:r>
                     </a:p>
                   </a:txBody>
@@ -5133,7 +5130,7 @@
                   </a:ext>
                 </a:extLst>
               </a:tr>
-              <a:tr h="388516">
+              <a:tr h="409128">
                 <a:tc>
                   <a:txBody>
                     <a:bodyPr/>
@@ -5252,8 +5249,8 @@
                         <a:buNone/>
                       </a:pPr>
                       <a:r>
-                        <a:rPr lang="en-US" sz="1100"/>
-                        <a:t>They don’t break the problem into flow or pseudocode.</a:t>
+                        <a:rPr lang="en-US" sz="1100" dirty="0"/>
+                        <a:t>Some don’t break the problem into flow or pseudocode.</a:t>
                       </a:r>
                     </a:p>
                   </a:txBody>
@@ -5303,7 +5300,7 @@
                   </a:ext>
                 </a:extLst>
               </a:tr>
-              <a:tr h="388516">
+              <a:tr h="409128">
                 <a:tc>
                   <a:txBody>
                     <a:bodyPr/>
@@ -5422,8 +5419,8 @@
                         <a:buNone/>
                       </a:pPr>
                       <a:r>
-                        <a:rPr lang="en-US" sz="1100"/>
-                        <a:t>They haven’t practiced enough low-level bit control.</a:t>
+                        <a:rPr lang="en-US" sz="1100" dirty="0"/>
+                        <a:t>Some haven’t practiced enough low-level bit control.</a:t>
                       </a:r>
                     </a:p>
                   </a:txBody>
@@ -5473,7 +5470,7 @@
                   </a:ext>
                 </a:extLst>
               </a:tr>
-              <a:tr h="501834">
+              <a:tr h="528458">
                 <a:tc>
                   <a:txBody>
                     <a:bodyPr/>
@@ -5592,15 +5589,15 @@
                         <a:buNone/>
                       </a:pPr>
                       <a:r>
-                        <a:rPr lang="en-US" sz="1100"/>
+                        <a:rPr lang="en-US" sz="1100" dirty="0"/>
                         <a:t>They don’t analyze </a:t>
                       </a:r>
                       <a:r>
-                        <a:rPr lang="en-US" sz="1100" i="1"/>
+                        <a:rPr lang="en-US" sz="1100" i="1" dirty="0"/>
                         <a:t>why</a:t>
                       </a:r>
                       <a:r>
-                        <a:rPr lang="en-US" sz="1100"/>
+                        <a:rPr lang="en-US" sz="1100" dirty="0"/>
                         <a:t> something works.</a:t>
                       </a:r>
                     </a:p>
@@ -5651,7 +5648,7 @@
                   </a:ext>
                 </a:extLst>
               </a:tr>
-              <a:tr h="615151">
+              <a:tr h="647786">
                 <a:tc>
                   <a:txBody>
                     <a:bodyPr/>
@@ -5716,7 +5713,7 @@
                         <a:buNone/>
                       </a:pPr>
                       <a:r>
-                        <a:rPr lang="en-US" sz="1100"/>
+                        <a:rPr lang="en-US" sz="1100" dirty="0"/>
                         <a:t>They treat each lab (PWM, UART, ADC) as separate.</a:t>
                       </a:r>
                     </a:p>
@@ -5771,7 +5768,15 @@
                       </a:pPr>
                       <a:r>
                         <a:rPr lang="en-US" sz="1100" dirty="0"/>
-                        <a:t>They don’t see common hardware patterns — initialization, enable bits, flags.</a:t>
+                        <a:t>They don’t see common hardware patterns (</a:t>
+                      </a:r>
+                      <a:r>
+                        <a:rPr lang="en-US" sz="1100" dirty="0" err="1"/>
+                        <a:t>initialisation</a:t>
+                      </a:r>
+                      <a:r>
+                        <a:rPr lang="en-US" sz="1100" dirty="0"/>
+                        <a:t>, enable bits, flags.)</a:t>
                       </a:r>
                     </a:p>
                   </a:txBody>
@@ -5907,7 +5912,7 @@
           <p:nvPr>
             <p:extLst>
               <p:ext uri="{D42A27DB-BD31-4B8C-83A1-F6EECF244321}">
-                <p14:modId xmlns:p14="http://schemas.microsoft.com/office/powerpoint/2010/main" val="692849624"/>
+                <p14:modId xmlns:p14="http://schemas.microsoft.com/office/powerpoint/2010/main" val="3316882803"/>
               </p:ext>
             </p:extLst>
           </p:nvPr>
@@ -6479,7 +6484,7 @@
                       </a:pPr>
                       <a:r>
                         <a:rPr lang="en-US" sz="1100" dirty="0"/>
-                        <a:t>Type code from scratch - no copy. Even 20 lines.</a:t>
+                        <a:t>Type code from scratch - no copy. Even 10-20 lines.</a:t>
                       </a:r>
                     </a:p>
                   </a:txBody>
@@ -6593,7 +6598,7 @@
                         <a:buNone/>
                       </a:pPr>
                       <a:r>
-                        <a:rPr lang="en-IN" sz="1100"/>
+                        <a:rPr lang="en-IN" sz="1100" dirty="0"/>
                         <a:t>Always draw flowchart first.</a:t>
                       </a:r>
                     </a:p>
@@ -6708,7 +6713,7 @@
                         <a:buNone/>
                       </a:pPr>
                       <a:r>
-                        <a:rPr lang="en-IN" sz="1100"/>
+                        <a:rPr lang="en-IN" sz="1100" dirty="0"/>
                         <a:t>Practice bit-level macros.</a:t>
                       </a:r>
                     </a:p>

</xml_diff>